<commit_message>
fix: Alterando informações do Template | Nome, Data de Nascimento e IMG
</commit_message>
<xml_diff>
--- a/template.pptx
+++ b/template.pptx
@@ -31,7 +31,7 @@
       </p:grpSpPr>
       <p:sp>
         <p:nvSpPr>
-          <p:cNvPr id="5" name="PlaceHolder 1"/>
+          <p:cNvPr id="4" name="PlaceHolder 1"/>
           <p:cNvSpPr>
             <a:spLocks noGrp="1"/>
           </p:cNvSpPr>
@@ -42,7 +42,7 @@
         <p:spPr>
           <a:xfrm>
             <a:off x="504000" y="226080"/>
-            <a:ext cx="9071640" cy="946440"/>
+            <a:ext cx="9071280" cy="946080"/>
           </a:xfrm>
           <a:prstGeom prst="rect">
             <a:avLst/>
@@ -71,7 +71,7 @@
       </p:sp>
       <p:sp>
         <p:nvSpPr>
-          <p:cNvPr id="6" name="PlaceHolder 2"/>
+          <p:cNvPr id="5" name="PlaceHolder 2"/>
           <p:cNvSpPr>
             <a:spLocks noGrp="1"/>
           </p:cNvSpPr>
@@ -82,7 +82,7 @@
         <p:spPr>
           <a:xfrm>
             <a:off x="504000" y="1326600"/>
-            <a:ext cx="9071640" cy="3288240"/>
+            <a:ext cx="9072000" cy="3288600"/>
           </a:xfrm>
           <a:prstGeom prst="rect">
             <a:avLst/>
@@ -116,7 +116,7 @@
             <a:spLocks noGrp="1"/>
           </p:cNvSpPr>
           <p:nvPr>
-            <p:ph type="ftr" idx="2"/>
+            <p:ph type="ftr" idx="1"/>
           </p:nvPr>
         </p:nvSpPr>
         <p:spPr/>
@@ -136,14 +136,14 @@
             <a:spLocks noGrp="1"/>
           </p:cNvSpPr>
           <p:nvPr>
-            <p:ph type="sldNum" idx="3"/>
+            <p:ph type="sldNum" idx="2"/>
           </p:nvPr>
         </p:nvSpPr>
         <p:spPr/>
         <p:txBody>
           <a:bodyPr/>
           <a:p>
-            <a:fld id="{31D4485C-2F6B-4584-96E1-C9F34967425E}" type="slidenum">
+            <a:fld id="{150BB156-9CEF-4CBA-A9B2-62B3BCA383E1}" type="slidenum">
               <a:t>&lt;#&gt;</a:t>
             </a:fld>
           </a:p>
@@ -156,7 +156,7 @@
             <a:spLocks noGrp="1"/>
           </p:cNvSpPr>
           <p:nvPr>
-            <p:ph type="dt" idx="1"/>
+            <p:ph type="dt" idx="3"/>
           </p:nvPr>
         </p:nvSpPr>
         <p:spPr/>
@@ -205,7 +205,7 @@
         <p:spPr>
           <a:xfrm>
             <a:off x="504000" y="226080"/>
-            <a:ext cx="9071640" cy="946440"/>
+            <a:ext cx="9071280" cy="946080"/>
           </a:xfrm>
           <a:prstGeom prst="rect">
             <a:avLst/>
@@ -220,11 +220,11 @@
             <a:noAutofit/>
           </a:bodyPr>
           <a:p>
-            <a:pPr indent="0" algn="ctr">
+            <a:pPr indent="0">
               <a:buNone/>
             </a:pPr>
             <a:r>
-              <a:rPr b="0" lang="pt-BR" sz="4400" spc="-1" strike="noStrike">
+              <a:rPr b="0" lang="pt-BR" sz="1800" spc="-1" strike="noStrike">
                 <a:solidFill>
                   <a:srgbClr val="000000"/>
                 </a:solidFill>
@@ -232,7 +232,7 @@
               </a:rPr>
               <a:t>Clique para editar o formato do texto do título</a:t>
             </a:r>
-            <a:endParaRPr b="0" lang="pt-BR" sz="4400" spc="-1" strike="noStrike">
+            <a:endParaRPr b="0" lang="pt-BR" sz="1800" spc="-1" strike="noStrike">
               <a:solidFill>
                 <a:srgbClr val="000000"/>
               </a:solidFill>
@@ -248,298 +248,13 @@
             <a:spLocks noGrp="1"/>
           </p:cNvSpPr>
           <p:nvPr>
-            <p:ph type="body"/>
-          </p:nvPr>
-        </p:nvSpPr>
-        <p:spPr>
-          <a:xfrm>
-            <a:off x="504000" y="1326600"/>
-            <a:ext cx="9071640" cy="3288240"/>
-          </a:xfrm>
-          <a:prstGeom prst="rect">
-            <a:avLst/>
-          </a:prstGeom>
-          <a:noFill/>
-          <a:ln w="0">
-            <a:noFill/>
-          </a:ln>
-        </p:spPr>
-        <p:txBody>
-          <a:bodyPr lIns="0" rIns="0" tIns="0" bIns="0" anchor="t">
-            <a:normAutofit/>
-          </a:bodyPr>
-          <a:p>
-            <a:pPr marL="432000" indent="-324000">
-              <a:spcBef>
-                <a:spcPts val="1417"/>
-              </a:spcBef>
-              <a:buClr>
-                <a:srgbClr val="000000"/>
-              </a:buClr>
-              <a:buSzPct val="45000"/>
-              <a:buFont typeface="Wingdings" charset="2"/>
-              <a:buChar char=""/>
-            </a:pPr>
-            <a:r>
-              <a:rPr b="0" lang="pt-BR" sz="3200" spc="-1" strike="noStrike">
-                <a:solidFill>
-                  <a:srgbClr val="000000"/>
-                </a:solidFill>
-                <a:latin typeface="Arial"/>
-              </a:rPr>
-              <a:t>Clique para editar o formato de texto dos tópicos</a:t>
-            </a:r>
-            <a:endParaRPr b="0" lang="pt-BR" sz="3200" spc="-1" strike="noStrike">
-              <a:solidFill>
-                <a:srgbClr val="000000"/>
-              </a:solidFill>
-              <a:latin typeface="Arial"/>
-            </a:endParaRPr>
-          </a:p>
-          <a:p>
-            <a:pPr lvl="1" marL="864000" indent="-324000">
-              <a:spcBef>
-                <a:spcPts val="1134"/>
-              </a:spcBef>
-              <a:buClr>
-                <a:srgbClr val="000000"/>
-              </a:buClr>
-              <a:buSzPct val="75000"/>
-              <a:buFont typeface="Symbol" charset="2"/>
-              <a:buChar char=""/>
-            </a:pPr>
-            <a:r>
-              <a:rPr b="0" lang="pt-BR" sz="2800" spc="-1" strike="noStrike">
-                <a:solidFill>
-                  <a:srgbClr val="000000"/>
-                </a:solidFill>
-                <a:latin typeface="Arial"/>
-              </a:rPr>
-              <a:t>2.º nível de tópicos</a:t>
-            </a:r>
-            <a:endParaRPr b="0" lang="pt-BR" sz="2800" spc="-1" strike="noStrike">
-              <a:solidFill>
-                <a:srgbClr val="000000"/>
-              </a:solidFill>
-              <a:latin typeface="Arial"/>
-            </a:endParaRPr>
-          </a:p>
-          <a:p>
-            <a:pPr lvl="2" marL="1296000" indent="-288000">
-              <a:spcBef>
-                <a:spcPts val="850"/>
-              </a:spcBef>
-              <a:buClr>
-                <a:srgbClr val="000000"/>
-              </a:buClr>
-              <a:buSzPct val="45000"/>
-              <a:buFont typeface="Wingdings" charset="2"/>
-              <a:buChar char=""/>
-            </a:pPr>
-            <a:r>
-              <a:rPr b="0" lang="pt-BR" sz="2400" spc="-1" strike="noStrike">
-                <a:solidFill>
-                  <a:srgbClr val="000000"/>
-                </a:solidFill>
-                <a:latin typeface="Arial"/>
-              </a:rPr>
-              <a:t>3.º nível de tópicos</a:t>
-            </a:r>
-            <a:endParaRPr b="0" lang="pt-BR" sz="2400" spc="-1" strike="noStrike">
-              <a:solidFill>
-                <a:srgbClr val="000000"/>
-              </a:solidFill>
-              <a:latin typeface="Arial"/>
-            </a:endParaRPr>
-          </a:p>
-          <a:p>
-            <a:pPr lvl="3" marL="1728000" indent="-216000">
-              <a:spcBef>
-                <a:spcPts val="567"/>
-              </a:spcBef>
-              <a:buClr>
-                <a:srgbClr val="000000"/>
-              </a:buClr>
-              <a:buSzPct val="75000"/>
-              <a:buFont typeface="Symbol" charset="2"/>
-              <a:buChar char=""/>
-            </a:pPr>
-            <a:r>
-              <a:rPr b="0" lang="pt-BR" sz="2000" spc="-1" strike="noStrike">
-                <a:solidFill>
-                  <a:srgbClr val="000000"/>
-                </a:solidFill>
-                <a:latin typeface="Arial"/>
-              </a:rPr>
-              <a:t>4.º nível de tópicos</a:t>
-            </a:r>
-            <a:endParaRPr b="0" lang="pt-BR" sz="2000" spc="-1" strike="noStrike">
-              <a:solidFill>
-                <a:srgbClr val="000000"/>
-              </a:solidFill>
-              <a:latin typeface="Arial"/>
-            </a:endParaRPr>
-          </a:p>
-          <a:p>
-            <a:pPr lvl="4" marL="2160000" indent="-216000">
-              <a:spcBef>
-                <a:spcPts val="283"/>
-              </a:spcBef>
-              <a:buClr>
-                <a:srgbClr val="000000"/>
-              </a:buClr>
-              <a:buSzPct val="45000"/>
-              <a:buFont typeface="Wingdings" charset="2"/>
-              <a:buChar char=""/>
-            </a:pPr>
-            <a:r>
-              <a:rPr b="0" lang="pt-BR" sz="2000" spc="-1" strike="noStrike">
-                <a:solidFill>
-                  <a:srgbClr val="000000"/>
-                </a:solidFill>
-                <a:latin typeface="Arial"/>
-              </a:rPr>
-              <a:t>5.º nível de tópicos</a:t>
-            </a:r>
-            <a:endParaRPr b="0" lang="pt-BR" sz="2000" spc="-1" strike="noStrike">
-              <a:solidFill>
-                <a:srgbClr val="000000"/>
-              </a:solidFill>
-              <a:latin typeface="Arial"/>
-            </a:endParaRPr>
-          </a:p>
-          <a:p>
-            <a:pPr lvl="5" marL="2592000" indent="-216000">
-              <a:spcBef>
-                <a:spcPts val="283"/>
-              </a:spcBef>
-              <a:buClr>
-                <a:srgbClr val="000000"/>
-              </a:buClr>
-              <a:buSzPct val="45000"/>
-              <a:buFont typeface="Wingdings" charset="2"/>
-              <a:buChar char=""/>
-            </a:pPr>
-            <a:r>
-              <a:rPr b="0" lang="pt-BR" sz="2000" spc="-1" strike="noStrike">
-                <a:solidFill>
-                  <a:srgbClr val="000000"/>
-                </a:solidFill>
-                <a:latin typeface="Arial"/>
-              </a:rPr>
-              <a:t>6.º nível de tópicos</a:t>
-            </a:r>
-            <a:endParaRPr b="0" lang="pt-BR" sz="2000" spc="-1" strike="noStrike">
-              <a:solidFill>
-                <a:srgbClr val="000000"/>
-              </a:solidFill>
-              <a:latin typeface="Arial"/>
-            </a:endParaRPr>
-          </a:p>
-          <a:p>
-            <a:pPr lvl="6" marL="3024000" indent="-216000">
-              <a:spcBef>
-                <a:spcPts val="283"/>
-              </a:spcBef>
-              <a:buClr>
-                <a:srgbClr val="000000"/>
-              </a:buClr>
-              <a:buSzPct val="45000"/>
-              <a:buFont typeface="Wingdings" charset="2"/>
-              <a:buChar char=""/>
-            </a:pPr>
-            <a:r>
-              <a:rPr b="0" lang="pt-BR" sz="2000" spc="-1" strike="noStrike">
-                <a:solidFill>
-                  <a:srgbClr val="000000"/>
-                </a:solidFill>
-                <a:latin typeface="Arial"/>
-              </a:rPr>
-              <a:t>7.º nível de tópicos</a:t>
-            </a:r>
-            <a:endParaRPr b="0" lang="pt-BR" sz="2000" spc="-1" strike="noStrike">
-              <a:solidFill>
-                <a:srgbClr val="000000"/>
-              </a:solidFill>
-              <a:latin typeface="Arial"/>
-            </a:endParaRPr>
-          </a:p>
-        </p:txBody>
-      </p:sp>
-      <p:sp>
-        <p:nvSpPr>
-          <p:cNvPr id="2" name="PlaceHolder 3"/>
-          <p:cNvSpPr>
-            <a:spLocks noGrp="1"/>
-          </p:cNvSpPr>
-          <p:nvPr>
-            <p:ph type="dt" idx="1"/>
-          </p:nvPr>
-        </p:nvSpPr>
-        <p:spPr>
-          <a:xfrm>
-            <a:off x="504000" y="5165280"/>
-            <a:ext cx="2348280" cy="390600"/>
-          </a:xfrm>
-          <a:prstGeom prst="rect">
-            <a:avLst/>
-          </a:prstGeom>
-          <a:noFill/>
-          <a:ln w="0">
-            <a:noFill/>
-          </a:ln>
-        </p:spPr>
-        <p:txBody>
-          <a:bodyPr lIns="0" rIns="0" tIns="0" bIns="0" anchor="t">
-            <a:noAutofit/>
-          </a:bodyPr>
-          <a:lstStyle>
-            <a:lvl1pPr indent="0">
-              <a:buNone/>
-              <a:defRPr b="0" lang="pt-BR" sz="1400" spc="-1" strike="noStrike">
-                <a:solidFill>
-                  <a:srgbClr val="000000"/>
-                </a:solidFill>
-                <a:latin typeface="Times New Roman"/>
-              </a:defRPr>
-            </a:lvl1pPr>
-          </a:lstStyle>
-          <a:p>
-            <a:pPr indent="0">
-              <a:buNone/>
-            </a:pPr>
-            <a:r>
-              <a:rPr b="0" lang="pt-BR" sz="1400" spc="-1" strike="noStrike">
-                <a:solidFill>
-                  <a:srgbClr val="000000"/>
-                </a:solidFill>
-                <a:latin typeface="Times New Roman"/>
-              </a:rPr>
-              <a:t>&lt;data/hora&gt;</a:t>
-            </a:r>
-            <a:endParaRPr b="0" lang="pt-BR" sz="1400" spc="-1" strike="noStrike">
-              <a:solidFill>
-                <a:srgbClr val="000000"/>
-              </a:solidFill>
-              <a:latin typeface="Times New Roman"/>
-            </a:endParaRPr>
-          </a:p>
-        </p:txBody>
-      </p:sp>
-      <p:sp>
-        <p:nvSpPr>
-          <p:cNvPr id="3" name="PlaceHolder 4"/>
-          <p:cNvSpPr>
-            <a:spLocks noGrp="1"/>
-          </p:cNvSpPr>
-          <p:nvPr>
-            <p:ph type="ftr" idx="2"/>
+            <p:ph type="ftr" idx="1"/>
           </p:nvPr>
         </p:nvSpPr>
         <p:spPr>
           <a:xfrm>
             <a:off x="3447360" y="5165280"/>
-            <a:ext cx="3195000" cy="390600"/>
+            <a:ext cx="3194640" cy="390240"/>
           </a:xfrm>
           <a:prstGeom prst="rect">
             <a:avLst/>
@@ -555,7 +270,13 @@
           </a:bodyPr>
           <a:lstStyle>
             <a:lvl1pPr indent="0" algn="ctr">
-              <a:buNone/>
+              <a:lnSpc>
+                <a:spcPct val="100000"/>
+              </a:lnSpc>
+              <a:buNone/>
+              <a:tabLst>
+                <a:tab algn="l" pos="0"/>
+              </a:tabLst>
               <a:defRPr b="0" lang="pt-BR" sz="1400" spc="-1" strike="noStrike">
                 <a:solidFill>
                   <a:srgbClr val="000000"/>
@@ -566,7 +287,13 @@
           </a:lstStyle>
           <a:p>
             <a:pPr indent="0" algn="ctr">
-              <a:buNone/>
+              <a:lnSpc>
+                <a:spcPct val="100000"/>
+              </a:lnSpc>
+              <a:buNone/>
+              <a:tabLst>
+                <a:tab algn="l" pos="0"/>
+              </a:tabLst>
             </a:pPr>
             <a:r>
               <a:rPr b="0" lang="pt-BR" sz="1400" spc="-1" strike="noStrike">
@@ -588,18 +315,18 @@
       </p:sp>
       <p:sp>
         <p:nvSpPr>
-          <p:cNvPr id="4" name="PlaceHolder 5"/>
-          <p:cNvSpPr>
-            <a:spLocks noGrp="1"/>
-          </p:cNvSpPr>
-          <p:nvPr>
-            <p:ph type="sldNum" idx="3"/>
+          <p:cNvPr id="2" name="PlaceHolder 3"/>
+          <p:cNvSpPr>
+            <a:spLocks noGrp="1"/>
+          </p:cNvSpPr>
+          <p:nvPr>
+            <p:ph type="sldNum" idx="2"/>
           </p:nvPr>
         </p:nvSpPr>
         <p:spPr>
           <a:xfrm>
             <a:off x="7227360" y="5165280"/>
-            <a:ext cx="2348280" cy="390600"/>
+            <a:ext cx="2347920" cy="390240"/>
           </a:xfrm>
           <a:prstGeom prst="rect">
             <a:avLst/>
@@ -615,7 +342,13 @@
           </a:bodyPr>
           <a:lstStyle>
             <a:lvl1pPr indent="0" algn="r">
-              <a:buNone/>
+              <a:lnSpc>
+                <a:spcPct val="100000"/>
+              </a:lnSpc>
+              <a:buNone/>
+              <a:tabLst>
+                <a:tab algn="l" pos="0"/>
+              </a:tabLst>
               <a:defRPr b="0" lang="pt-BR" sz="1400" spc="-1" strike="noStrike">
                 <a:solidFill>
                   <a:srgbClr val="000000"/>
@@ -626,9 +359,15 @@
           </a:lstStyle>
           <a:p>
             <a:pPr indent="0" algn="r">
-              <a:buNone/>
+              <a:lnSpc>
+                <a:spcPct val="100000"/>
+              </a:lnSpc>
+              <a:buNone/>
+              <a:tabLst>
+                <a:tab algn="l" pos="0"/>
+              </a:tabLst>
             </a:pPr>
-            <a:fld id="{FF1B640F-CA17-4AB9-8688-683BB4258E69}" type="slidenum">
+            <a:fld id="{833D3DB3-B017-4D9A-85E1-A9D6BFCD538E}" type="slidenum">
               <a:rPr b="0" lang="pt-BR" sz="1400" spc="-1" strike="noStrike">
                 <a:solidFill>
                   <a:srgbClr val="000000"/>
@@ -637,6 +376,66 @@
               </a:rPr>
               <a:t>&lt;número&gt;</a:t>
             </a:fld>
+            <a:endParaRPr b="0" lang="pt-BR" sz="1400" spc="-1" strike="noStrike">
+              <a:solidFill>
+                <a:srgbClr val="000000"/>
+              </a:solidFill>
+              <a:latin typeface="Times New Roman"/>
+            </a:endParaRPr>
+          </a:p>
+        </p:txBody>
+      </p:sp>
+      <p:sp>
+        <p:nvSpPr>
+          <p:cNvPr id="3" name="PlaceHolder 4"/>
+          <p:cNvSpPr>
+            <a:spLocks noGrp="1"/>
+          </p:cNvSpPr>
+          <p:nvPr>
+            <p:ph type="dt" idx="3"/>
+          </p:nvPr>
+        </p:nvSpPr>
+        <p:spPr>
+          <a:xfrm>
+            <a:off x="504000" y="5165280"/>
+            <a:ext cx="2347920" cy="390240"/>
+          </a:xfrm>
+          <a:prstGeom prst="rect">
+            <a:avLst/>
+          </a:prstGeom>
+          <a:noFill/>
+          <a:ln w="0">
+            <a:noFill/>
+          </a:ln>
+        </p:spPr>
+        <p:txBody>
+          <a:bodyPr lIns="0" rIns="0" tIns="0" bIns="0" anchor="t">
+            <a:noAutofit/>
+          </a:bodyPr>
+          <a:lstStyle>
+            <a:lvl1pPr indent="0">
+              <a:buNone/>
+              <a:defRPr b="0" lang="pt-BR" sz="1400" spc="-1" strike="noStrike">
+                <a:solidFill>
+                  <a:srgbClr val="000000"/>
+                </a:solidFill>
+                <a:latin typeface="Times New Roman"/>
+              </a:defRPr>
+            </a:lvl1pPr>
+          </a:lstStyle>
+          <a:p>
+            <a:pPr indent="0">
+              <a:buNone/>
+            </a:pPr>
+            <a:r>
+              <a:rPr b="0" lang="pt-BR" sz="1400" spc="-1" strike="noStrike">
+                <a:solidFill>
+                  <a:srgbClr val="000000"/>
+                </a:solidFill>
+                <a:latin typeface="Times New Roman"/>
+              </a:rPr>
+              <a:t>&lt;data/hora&gt;</a:t>
+            </a:r>
             <a:endParaRPr b="0" lang="pt-BR" sz="1400" spc="-1" strike="noStrike">
               <a:solidFill>
                 <a:srgbClr val="000000"/>
@@ -674,7 +473,7 @@
       </p:grpSpPr>
       <p:pic>
         <p:nvPicPr>
-          <p:cNvPr id="7" name="" descr=""/>
+          <p:cNvPr id="6" name="" descr=""/>
           <p:cNvPicPr/>
           <p:nvPr/>
         </p:nvPicPr>
@@ -685,7 +484,7 @@
         <p:spPr>
           <a:xfrm>
             <a:off x="3427560" y="1260000"/>
-            <a:ext cx="2692440" cy="1980000"/>
+            <a:ext cx="2692080" cy="1979640"/>
           </a:xfrm>
           <a:prstGeom prst="rect">
             <a:avLst/>
@@ -697,14 +496,14 @@
       </p:pic>
       <p:sp>
         <p:nvSpPr>
-          <p:cNvPr id="8" name=""/>
-          <p:cNvSpPr txBox="1"/>
+          <p:cNvPr id="7" name=""/>
+          <p:cNvSpPr/>
           <p:nvPr/>
         </p:nvSpPr>
         <p:spPr>
           <a:xfrm>
             <a:off x="3780000" y="3600000"/>
-            <a:ext cx="2160000" cy="941400"/>
+            <a:ext cx="2159640" cy="941040"/>
           </a:xfrm>
           <a:prstGeom prst="rect">
             <a:avLst/>
@@ -714,11 +513,22 @@
             <a:noFill/>
           </a:ln>
         </p:spPr>
+        <p:style>
+          <a:lnRef idx="0"/>
+          <a:fillRef idx="0"/>
+          <a:effectRef idx="0"/>
+          <a:fontRef idx="minor"/>
+        </p:style>
         <p:txBody>
           <a:bodyPr lIns="90000" rIns="90000" tIns="45000" bIns="45000" anchor="t">
             <a:noAutofit/>
           </a:bodyPr>
           <a:p>
+            <a:pPr>
+              <a:lnSpc>
+                <a:spcPct val="100000"/>
+              </a:lnSpc>
+            </a:pPr>
             <a:r>
               <a:rPr b="0" lang="pt-BR" sz="1000" spc="-1" strike="noStrike">
                 <a:solidFill>
@@ -738,55 +548,7 @@
                 </a:solidFill>
                 <a:latin typeface="Arial"/>
               </a:rPr>
-              <a:t>{{CARGO}} </a:t>
-            </a:r>
-            <a:br>
-              <a:rPr sz="1000"/>
-            </a:br>
-            <a:r>
-              <a:rPr b="0" lang="pt-BR" sz="1000" spc="-1" strike="noStrike">
-                <a:solidFill>
-                  <a:srgbClr val="000000"/>
-                </a:solidFill>
-                <a:latin typeface="Arial"/>
-              </a:rPr>
-              <a:t>{{EMPRESA}} </a:t>
-            </a:r>
-            <a:br>
-              <a:rPr sz="1000"/>
-            </a:br>
-            <a:r>
-              <a:rPr b="0" lang="pt-BR" sz="1000" spc="-1" strike="noStrike">
-                <a:solidFill>
-                  <a:srgbClr val="000000"/>
-                </a:solidFill>
-                <a:latin typeface="Arial"/>
-              </a:rPr>
-              <a:t>{{EMAIL}} </a:t>
-            </a:r>
-            <a:br>
-              <a:rPr sz="1000"/>
-            </a:br>
-            <a:r>
-              <a:rPr b="0" lang="pt-BR" sz="1000" spc="-1" strike="noStrike">
-                <a:solidFill>
-                  <a:srgbClr val="000000"/>
-                </a:solidFill>
-                <a:latin typeface="Arial"/>
-              </a:rPr>
               <a:t>{{DATA_NASCIMENTO}}</a:t>
-            </a:r>
-            <a:br>
-              <a:rPr sz="1000"/>
-            </a:br>
-            <a:r>
-              <a:rPr b="0" lang="pt-BR" sz="1000" spc="-1" strike="noStrike">
-                <a:solidFill>
-                  <a:srgbClr val="000000"/>
-                </a:solidFill>
-                <a:latin typeface="Arial"/>
-              </a:rPr>
-              <a:t>{{TITULO}} </a:t>
             </a:r>
             <a:endParaRPr b="0" lang="pt-BR" sz="1000" spc="-1" strike="noStrike">
               <a:solidFill>

</xml_diff>